<commit_message>
2024 reduction set-up mainly completed
</commit_message>
<xml_diff>
--- a/Data/sources/reduction/Mantid_nxspe_2024/cycle06_05/vanadium/EiAndElasticLineForVanadium.pptx
+++ b/Data/sources/reduction/Mantid_nxspe_2024/cycle06_05/vanadium/EiAndElasticLineForVanadium.pptx
@@ -262,7 +262,7 @@
           <a:p>
             <a:fld id="{D1721A36-19D5-4488-87C2-536213FC39A1}" type="datetimeFigureOut">
               <a:rPr lang="en-GB" smtClean="0"/>
-              <a:t>11/09/2024</a:t>
+              <a:t>19/09/2024</a:t>
             </a:fld>
             <a:endParaRPr lang="en-GB"/>
           </a:p>
@@ -462,7 +462,7 @@
           <a:p>
             <a:fld id="{D1721A36-19D5-4488-87C2-536213FC39A1}" type="datetimeFigureOut">
               <a:rPr lang="en-GB" smtClean="0"/>
-              <a:t>11/09/2024</a:t>
+              <a:t>19/09/2024</a:t>
             </a:fld>
             <a:endParaRPr lang="en-GB"/>
           </a:p>
@@ -672,7 +672,7 @@
           <a:p>
             <a:fld id="{D1721A36-19D5-4488-87C2-536213FC39A1}" type="datetimeFigureOut">
               <a:rPr lang="en-GB" smtClean="0"/>
-              <a:t>11/09/2024</a:t>
+              <a:t>19/09/2024</a:t>
             </a:fld>
             <a:endParaRPr lang="en-GB"/>
           </a:p>
@@ -872,7 +872,7 @@
           <a:p>
             <a:fld id="{D1721A36-19D5-4488-87C2-536213FC39A1}" type="datetimeFigureOut">
               <a:rPr lang="en-GB" smtClean="0"/>
-              <a:t>11/09/2024</a:t>
+              <a:t>19/09/2024</a:t>
             </a:fld>
             <a:endParaRPr lang="en-GB"/>
           </a:p>
@@ -1148,7 +1148,7 @@
           <a:p>
             <a:fld id="{D1721A36-19D5-4488-87C2-536213FC39A1}" type="datetimeFigureOut">
               <a:rPr lang="en-GB" smtClean="0"/>
-              <a:t>11/09/2024</a:t>
+              <a:t>19/09/2024</a:t>
             </a:fld>
             <a:endParaRPr lang="en-GB"/>
           </a:p>
@@ -1416,7 +1416,7 @@
           <a:p>
             <a:fld id="{D1721A36-19D5-4488-87C2-536213FC39A1}" type="datetimeFigureOut">
               <a:rPr lang="en-GB" smtClean="0"/>
-              <a:t>11/09/2024</a:t>
+              <a:t>19/09/2024</a:t>
             </a:fld>
             <a:endParaRPr lang="en-GB"/>
           </a:p>
@@ -1831,7 +1831,7 @@
           <a:p>
             <a:fld id="{D1721A36-19D5-4488-87C2-536213FC39A1}" type="datetimeFigureOut">
               <a:rPr lang="en-GB" smtClean="0"/>
-              <a:t>11/09/2024</a:t>
+              <a:t>19/09/2024</a:t>
             </a:fld>
             <a:endParaRPr lang="en-GB"/>
           </a:p>
@@ -1973,7 +1973,7 @@
           <a:p>
             <a:fld id="{D1721A36-19D5-4488-87C2-536213FC39A1}" type="datetimeFigureOut">
               <a:rPr lang="en-GB" smtClean="0"/>
-              <a:t>11/09/2024</a:t>
+              <a:t>19/09/2024</a:t>
             </a:fld>
             <a:endParaRPr lang="en-GB"/>
           </a:p>
@@ -2086,7 +2086,7 @@
           <a:p>
             <a:fld id="{D1721A36-19D5-4488-87C2-536213FC39A1}" type="datetimeFigureOut">
               <a:rPr lang="en-GB" smtClean="0"/>
-              <a:t>11/09/2024</a:t>
+              <a:t>19/09/2024</a:t>
             </a:fld>
             <a:endParaRPr lang="en-GB"/>
           </a:p>
@@ -2399,7 +2399,7 @@
           <a:p>
             <a:fld id="{D1721A36-19D5-4488-87C2-536213FC39A1}" type="datetimeFigureOut">
               <a:rPr lang="en-GB" smtClean="0"/>
-              <a:t>11/09/2024</a:t>
+              <a:t>19/09/2024</a:t>
             </a:fld>
             <a:endParaRPr lang="en-GB"/>
           </a:p>
@@ -2688,7 +2688,7 @@
           <a:p>
             <a:fld id="{D1721A36-19D5-4488-87C2-536213FC39A1}" type="datetimeFigureOut">
               <a:rPr lang="en-GB" smtClean="0"/>
-              <a:t>11/09/2024</a:t>
+              <a:t>19/09/2024</a:t>
             </a:fld>
             <a:endParaRPr lang="en-GB"/>
           </a:p>
@@ -2931,7 +2931,7 @@
           <a:p>
             <a:fld id="{D1721A36-19D5-4488-87C2-536213FC39A1}" type="datetimeFigureOut">
               <a:rPr lang="en-GB" smtClean="0"/>
-              <a:t>11/09/2024</a:t>
+              <a:t>19/09/2024</a:t>
             </a:fld>
             <a:endParaRPr lang="en-GB"/>
           </a:p>
@@ -3348,6 +3348,36 @@
           <a:chExt cx="0" cy="0"/>
         </a:xfrm>
       </p:grpSpPr>
+      <p:pic>
+        <p:nvPicPr>
+          <p:cNvPr id="13" name="Picture 12">
+            <a:extLst>
+              <a:ext uri="{FF2B5EF4-FFF2-40B4-BE49-F238E27FC236}">
+                <a16:creationId xmlns:a16="http://schemas.microsoft.com/office/drawing/2014/main" id="{91FA222B-7BBC-D1B5-D856-CAAF87B50A50}"/>
+              </a:ext>
+            </a:extLst>
+          </p:cNvPr>
+          <p:cNvPicPr>
+            <a:picLocks noChangeAspect="1"/>
+          </p:cNvPicPr>
+          <p:nvPr/>
+        </p:nvPicPr>
+        <p:blipFill>
+          <a:blip r:embed="rId2"/>
+          <a:stretch>
+            <a:fillRect/>
+          </a:stretch>
+        </p:blipFill>
+        <p:spPr>
+          <a:xfrm>
+            <a:off x="6096000" y="918800"/>
+            <a:ext cx="3488992" cy="2593380"/>
+          </a:xfrm>
+          <a:prstGeom prst="rect">
+            <a:avLst/>
+          </a:prstGeom>
+        </p:spPr>
+      </p:pic>
       <p:sp>
         <p:nvSpPr>
           <p:cNvPr id="2" name="TextBox 1">
@@ -3398,7 +3428,7 @@
           <p:nvPr/>
         </p:nvPicPr>
         <p:blipFill>
-          <a:blip r:embed="rId2">
+          <a:blip r:embed="rId3">
             <a:extLst>
               <a:ext uri="{28A0092B-C50C-407E-A947-70E740481C1C}">
                 <a14:useLocalDpi xmlns:a14="http://schemas.microsoft.com/office/drawing/2010/main" val="0"/>
@@ -3419,47 +3449,6 @@
           </a:prstGeom>
         </p:spPr>
       </p:pic>
-      <p:pic>
-        <p:nvPicPr>
-          <p:cNvPr id="6" name="Picture 5" descr="A graph of energy transfer&#10;&#10;Description automatically generated">
-            <a:extLst>
-              <a:ext uri="{FF2B5EF4-FFF2-40B4-BE49-F238E27FC236}">
-                <a16:creationId xmlns:a16="http://schemas.microsoft.com/office/drawing/2014/main" id="{5581BE23-04F0-D6B0-AC55-B178D0592383}"/>
-              </a:ext>
-            </a:extLst>
-          </p:cNvPr>
-          <p:cNvPicPr>
-            <a:picLocks noChangeAspect="1"/>
-          </p:cNvPicPr>
-          <p:nvPr/>
-        </p:nvPicPr>
-        <p:blipFill>
-          <a:blip r:embed="rId3">
-            <a:extLst>
-              <a:ext uri="{28A0092B-C50C-407E-A947-70E740481C1C}">
-                <a14:useLocalDpi xmlns:a14="http://schemas.microsoft.com/office/drawing/2010/main" val="0"/>
-              </a:ext>
-            </a:extLst>
-          </a:blip>
-          <a:stretch>
-            <a:fillRect/>
-          </a:stretch>
-        </p:blipFill>
-        <p:spPr>
-          <a:xfrm>
-            <a:off x="6104128" y="1096677"/>
-            <a:ext cx="3010921" cy="2238028"/>
-          </a:xfrm>
-          <a:prstGeom prst="rect">
-            <a:avLst/>
-          </a:prstGeom>
-          <a:ln>
-            <a:solidFill>
-              <a:schemeClr val="bg1"/>
-            </a:solidFill>
-          </a:ln>
-        </p:spPr>
-      </p:pic>
       <p:cxnSp>
         <p:nvCxnSpPr>
           <p:cNvPr id="8" name="Straight Arrow Connector 7">
@@ -3469,13 +3458,15 @@
               </a:ext>
             </a:extLst>
           </p:cNvPr>
-          <p:cNvCxnSpPr/>
+          <p:cNvCxnSpPr>
+            <a:cxnSpLocks/>
+          </p:cNvCxnSpPr>
           <p:nvPr/>
         </p:nvCxnSpPr>
         <p:spPr>
           <a:xfrm>
             <a:off x="8259441" y="2481264"/>
-            <a:ext cx="422366" cy="422366"/>
+            <a:ext cx="926440" cy="629285"/>
           </a:xfrm>
           <a:prstGeom prst="straightConnector1">
             <a:avLst/>
@@ -3529,47 +3520,11 @@
           <a:p>
             <a:r>
               <a:rPr lang="en-GB" dirty="0"/>
-              <a:t>Binning range 735meV</a:t>
-            </a:r>
-          </a:p>
-        </p:txBody>
-      </p:sp>
-      <p:pic>
-        <p:nvPicPr>
-          <p:cNvPr id="11" name="Picture 10" descr="A graph of energy transfer&#10;&#10;Description automatically generated">
-            <a:extLst>
-              <a:ext uri="{FF2B5EF4-FFF2-40B4-BE49-F238E27FC236}">
-                <a16:creationId xmlns:a16="http://schemas.microsoft.com/office/drawing/2014/main" id="{534A7BEC-4E5B-FD51-E8DF-FB3F5170D57E}"/>
-              </a:ext>
-            </a:extLst>
-          </p:cNvPr>
-          <p:cNvPicPr>
-            <a:picLocks noChangeAspect="1"/>
-          </p:cNvPicPr>
-          <p:nvPr/>
-        </p:nvPicPr>
-        <p:blipFill>
-          <a:blip r:embed="rId4">
-            <a:extLst>
-              <a:ext uri="{28A0092B-C50C-407E-A947-70E740481C1C}">
-                <a14:useLocalDpi xmlns:a14="http://schemas.microsoft.com/office/drawing/2010/main" val="0"/>
-              </a:ext>
-            </a:extLst>
-          </a:blip>
-          <a:stretch>
-            <a:fillRect/>
-          </a:stretch>
-        </p:blipFill>
-        <p:spPr>
-          <a:xfrm>
-            <a:off x="6170577" y="3382134"/>
-            <a:ext cx="3168631" cy="2355255"/>
-          </a:xfrm>
-          <a:prstGeom prst="rect">
-            <a:avLst/>
-          </a:prstGeom>
-        </p:spPr>
-      </p:pic>
+              <a:t>Binning range 720meV</a:t>
+            </a:r>
+          </a:p>
+        </p:txBody>
+      </p:sp>
       <p:sp>
         <p:nvSpPr>
           <p:cNvPr id="12" name="TextBox 11">
@@ -3710,7 +3665,7 @@
         <p:spPr>
           <a:xfrm>
             <a:off x="1429421" y="6171971"/>
-            <a:ext cx="4087657" cy="369332"/>
+            <a:ext cx="4166205" cy="369332"/>
           </a:xfrm>
           <a:prstGeom prst="rect">
             <a:avLst/>
@@ -3725,7 +3680,7 @@
           <a:p>
             <a:r>
               <a:rPr lang="en-GB" dirty="0"/>
-              <a:t>Correct Ei = 793, so that E</a:t>
+              <a:t>Correct Ei = 785, so that E</a:t>
             </a:r>
             <a:r>
               <a:rPr lang="en-GB" sz="1600" dirty="0"/>
@@ -3733,17 +3688,123 @@
             </a:r>
             <a:r>
               <a:rPr lang="en-GB" dirty="0"/>
-              <a:t> = 0.01 where</a:t>
-            </a:r>
+              <a:t> = -0.35 where</a:t>
+            </a:r>
+          </a:p>
+        </p:txBody>
+      </p:sp>
+      <p:sp>
+        <p:nvSpPr>
+          <p:cNvPr id="3" name="TextBox 2">
+            <a:extLst>
+              <a:ext uri="{FF2B5EF4-FFF2-40B4-BE49-F238E27FC236}">
+                <a16:creationId xmlns:a16="http://schemas.microsoft.com/office/drawing/2014/main" id="{4D4B6C63-672B-1921-AA7E-8A5205EFDBA1}"/>
+              </a:ext>
+            </a:extLst>
+          </p:cNvPr>
+          <p:cNvSpPr txBox="1"/>
+          <p:nvPr/>
+        </p:nvSpPr>
+        <p:spPr>
+          <a:xfrm>
+            <a:off x="1019262" y="792760"/>
+            <a:ext cx="3206775" cy="369332"/>
+          </a:xfrm>
+          <a:prstGeom prst="rect">
+            <a:avLst/>
+          </a:prstGeom>
+          <a:noFill/>
+        </p:spPr>
+        <p:txBody>
+          <a:bodyPr wrap="none" rtlCol="0">
+            <a:spAutoFit/>
+          </a:bodyPr>
+          <a:lstStyle/>
+          <a:p>
+            <a:r>
+              <a:rPr lang="en-GB" dirty="0"/>
+              <a:t>Chopper peak around 800meV</a:t>
+            </a:r>
+          </a:p>
+        </p:txBody>
+      </p:sp>
+      <p:sp>
+        <p:nvSpPr>
+          <p:cNvPr id="7" name="TextBox 6">
+            <a:extLst>
+              <a:ext uri="{FF2B5EF4-FFF2-40B4-BE49-F238E27FC236}">
+                <a16:creationId xmlns:a16="http://schemas.microsoft.com/office/drawing/2014/main" id="{4F6DE506-BEC3-F464-7760-164760F3F95A}"/>
+              </a:ext>
+            </a:extLst>
+          </p:cNvPr>
+          <p:cNvSpPr txBox="1"/>
+          <p:nvPr/>
+        </p:nvSpPr>
+        <p:spPr>
+          <a:xfrm>
+            <a:off x="714279" y="5048122"/>
+            <a:ext cx="6097162" cy="646331"/>
+          </a:xfrm>
+          <a:prstGeom prst="rect">
+            <a:avLst/>
+          </a:prstGeom>
+          <a:noFill/>
+        </p:spPr>
+        <p:txBody>
+          <a:bodyPr wrap="square">
+            <a:spAutoFit/>
+          </a:bodyPr>
+          <a:lstStyle/>
+          <a:p>
+            <a:r>
+              <a:rPr lang="en-GB" dirty="0">
+                <a:solidFill>
+                  <a:srgbClr val="000080"/>
+                </a:solidFill>
+                <a:effectLst/>
+              </a:rPr>
+              <a:t>Using calculated value : 42.9 of absolute units correction factor (TGP)</a:t>
+            </a:r>
+            <a:endParaRPr lang="en-GB" dirty="0"/>
           </a:p>
         </p:txBody>
       </p:sp>
       <p:pic>
         <p:nvPicPr>
-          <p:cNvPr id="23" name="Picture 22">
-            <a:extLst>
-              <a:ext uri="{FF2B5EF4-FFF2-40B4-BE49-F238E27FC236}">
-                <a16:creationId xmlns:a16="http://schemas.microsoft.com/office/drawing/2014/main" id="{463705A1-563D-0CD7-30AA-DD7DF3DE19B8}"/>
+          <p:cNvPr id="19" name="Picture 18">
+            <a:extLst>
+              <a:ext uri="{FF2B5EF4-FFF2-40B4-BE49-F238E27FC236}">
+                <a16:creationId xmlns:a16="http://schemas.microsoft.com/office/drawing/2014/main" id="{7786F7CD-2F01-B6A9-14DE-D8FEEE3D1317}"/>
+              </a:ext>
+            </a:extLst>
+          </p:cNvPr>
+          <p:cNvPicPr>
+            <a:picLocks noChangeAspect="1"/>
+          </p:cNvPicPr>
+          <p:nvPr/>
+        </p:nvPicPr>
+        <p:blipFill>
+          <a:blip r:embed="rId4"/>
+          <a:stretch>
+            <a:fillRect/>
+          </a:stretch>
+        </p:blipFill>
+        <p:spPr>
+          <a:xfrm>
+            <a:off x="6102998" y="5899501"/>
+            <a:ext cx="3488992" cy="802409"/>
+          </a:xfrm>
+          <a:prstGeom prst="rect">
+            <a:avLst/>
+          </a:prstGeom>
+        </p:spPr>
+      </p:pic>
+      <p:pic>
+        <p:nvPicPr>
+          <p:cNvPr id="21" name="Picture 20">
+            <a:extLst>
+              <a:ext uri="{FF2B5EF4-FFF2-40B4-BE49-F238E27FC236}">
+                <a16:creationId xmlns:a16="http://schemas.microsoft.com/office/drawing/2014/main" id="{8FCE6657-D66A-38E8-6B8B-03F343E6A4B8}"/>
               </a:ext>
             </a:extLst>
           </p:cNvPr>
@@ -3760,49 +3821,14 @@
         </p:blipFill>
         <p:spPr>
           <a:xfrm>
-            <a:off x="5602336" y="6008974"/>
-            <a:ext cx="2981325" cy="695325"/>
+            <a:off x="6449248" y="3447914"/>
+            <a:ext cx="3142742" cy="2336011"/>
           </a:xfrm>
           <a:prstGeom prst="rect">
             <a:avLst/>
           </a:prstGeom>
         </p:spPr>
       </p:pic>
-      <p:sp>
-        <p:nvSpPr>
-          <p:cNvPr id="3" name="TextBox 2">
-            <a:extLst>
-              <a:ext uri="{FF2B5EF4-FFF2-40B4-BE49-F238E27FC236}">
-                <a16:creationId xmlns:a16="http://schemas.microsoft.com/office/drawing/2014/main" id="{4D4B6C63-672B-1921-AA7E-8A5205EFDBA1}"/>
-              </a:ext>
-            </a:extLst>
-          </p:cNvPr>
-          <p:cNvSpPr txBox="1"/>
-          <p:nvPr/>
-        </p:nvSpPr>
-        <p:spPr>
-          <a:xfrm>
-            <a:off x="1019262" y="792760"/>
-            <a:ext cx="3206775" cy="369332"/>
-          </a:xfrm>
-          <a:prstGeom prst="rect">
-            <a:avLst/>
-          </a:prstGeom>
-          <a:noFill/>
-        </p:spPr>
-        <p:txBody>
-          <a:bodyPr wrap="none" rtlCol="0">
-            <a:spAutoFit/>
-          </a:bodyPr>
-          <a:lstStyle/>
-          <a:p>
-            <a:r>
-              <a:rPr lang="en-GB" dirty="0"/>
-              <a:t>Chopper peak around 800meV</a:t>
-            </a:r>
-          </a:p>
-        </p:txBody>
-      </p:sp>
     </p:spTree>
     <p:extLst>
       <p:ext uri="{BB962C8B-B14F-4D97-AF65-F5344CB8AC3E}">
@@ -4014,6 +4040,47 @@
             <a:r>
               <a:rPr lang="en-GB" dirty="0" err="1"/>
               <a:t>meV</a:t>
+            </a:r>
+            <a:endParaRPr lang="en-GB" dirty="0"/>
+          </a:p>
+        </p:txBody>
+      </p:sp>
+      <p:sp>
+        <p:nvSpPr>
+          <p:cNvPr id="3" name="TextBox 2">
+            <a:extLst>
+              <a:ext uri="{FF2B5EF4-FFF2-40B4-BE49-F238E27FC236}">
+                <a16:creationId xmlns:a16="http://schemas.microsoft.com/office/drawing/2014/main" id="{09886696-7487-66DE-A7F1-43E3FFF01BF8}"/>
+              </a:ext>
+            </a:extLst>
+          </p:cNvPr>
+          <p:cNvSpPr txBox="1"/>
+          <p:nvPr/>
+        </p:nvSpPr>
+        <p:spPr>
+          <a:xfrm>
+            <a:off x="5205449" y="4827007"/>
+            <a:ext cx="6097162" cy="646331"/>
+          </a:xfrm>
+          <a:prstGeom prst="rect">
+            <a:avLst/>
+          </a:prstGeom>
+          <a:noFill/>
+        </p:spPr>
+        <p:txBody>
+          <a:bodyPr wrap="square">
+            <a:spAutoFit/>
+          </a:bodyPr>
+          <a:lstStyle/>
+          <a:p>
+            <a:r>
+              <a:rPr lang="en-GB" dirty="0">
+                <a:solidFill>
+                  <a:srgbClr val="000080"/>
+                </a:solidFill>
+                <a:effectLst/>
+              </a:rPr>
+              <a:t>*** Using calculated value : 4.563024378055734 of absolute units correction factor (TGP)</a:t>
             </a:r>
             <a:endParaRPr lang="en-GB" dirty="0"/>
           </a:p>

</xml_diff>